<commit_message>
new exercises for les07
</commit_message>
<xml_diff>
--- a/docs/slides/07/07_streams.pptx
+++ b/docs/slides/07/07_streams.pptx
@@ -2180,7 +2180,7 @@
           </a:ln>
           <a:extLst>
             <a:ext uri="{C572A759-6A51-4108-AA02-DFA0A04FC94B}">
-              <ma14:wrappingTextBoxFlag xmlns="" xmlns:ma14="http://schemas.microsoft.com/office/mac/drawingml/2011/main" val="1"/>
+              <ma14:wrappingTextBoxFlag xmlns:ma14="http://schemas.microsoft.com/office/mac/drawingml/2011/main" xmlns="" val="1"/>
             </a:ext>
           </a:extLst>
         </p:spPr>
@@ -2219,7 +2219,7 @@
           </a:ln>
           <a:extLst>
             <a:ext uri="{C572A759-6A51-4108-AA02-DFA0A04FC94B}">
-              <ma14:wrappingTextBoxFlag xmlns="" xmlns:ma14="http://schemas.microsoft.com/office/mac/drawingml/2011/main" val="1"/>
+              <ma14:wrappingTextBoxFlag xmlns:ma14="http://schemas.microsoft.com/office/mac/drawingml/2011/main" xmlns="" val="1"/>
             </a:ext>
           </a:extLst>
         </p:spPr>
@@ -3202,11 +3202,7 @@
             <a:pPr algn="r"/>
             <a:r>
               <a:rPr lang="en-US" smtClean="0"/>
-              <a:t>Prof</a:t>
-            </a:r>
-            <a:r>
-              <a:rPr lang="en-US" smtClean="0"/>
-              <a:t>. </a:t>
+              <a:t>Prof. </a:t>
             </a:r>
             <a:r>
               <a:rPr lang="en-US" dirty="0" smtClean="0"/>
@@ -5306,6 +5302,47 @@
           </a:p>
         </p:txBody>
       </p:sp>
+      <p:pic>
+        <p:nvPicPr>
+          <p:cNvPr id="1026" name="Picture 2" descr="Image result for mario"/>
+          <p:cNvPicPr>
+            <a:picLocks noChangeAspect="1" noChangeArrowheads="1"/>
+          </p:cNvPicPr>
+          <p:nvPr/>
+        </p:nvPicPr>
+        <p:blipFill>
+          <a:blip r:embed="rId3" cstate="print">
+            <a:extLst>
+              <a:ext uri="{28A0092B-C50C-407E-A947-70E740481C1C}">
+                <a14:useLocalDpi xmlns:a14="http://schemas.microsoft.com/office/drawing/2010/main" val="0"/>
+              </a:ext>
+            </a:extLst>
+          </a:blip>
+          <a:srcRect/>
+          <a:stretch>
+            <a:fillRect/>
+          </a:stretch>
+        </p:blipFill>
+        <p:spPr bwMode="auto">
+          <a:xfrm>
+            <a:off x="7010572" y="5430680"/>
+            <a:ext cx="1671554" cy="940249"/>
+          </a:xfrm>
+          <a:prstGeom prst="rect">
+            <a:avLst/>
+          </a:prstGeom>
+          <a:noFill/>
+          <a:extLst>
+            <a:ext uri="{909E8E84-426E-40DD-AFC4-6F175D3DCCD1}">
+              <a14:hiddenFill xmlns:a14="http://schemas.microsoft.com/office/drawing/2010/main">
+                <a:solidFill>
+                  <a:srgbClr val="FFFFFF"/>
+                </a:solidFill>
+              </a14:hiddenFill>
+            </a:ext>
+          </a:extLst>
+        </p:spPr>
+      </p:pic>
     </p:spTree>
     <p:extLst>
       <p:ext uri="{BB962C8B-B14F-4D97-AF65-F5344CB8AC3E}">
@@ -12208,7 +12245,19 @@
             </a:r>
             <a:r>
               <a:rPr lang="en-US" dirty="0" smtClean="0"/>
-              <a:t>, can look at indices from 0 to N-1</a:t>
+              <a:t>, can look at indices from </a:t>
+            </a:r>
+            <a:r>
+              <a:rPr lang="en-US" i="1" dirty="0" smtClean="0"/>
+              <a:t>0</a:t>
+            </a:r>
+            <a:r>
+              <a:rPr lang="en-US" dirty="0" smtClean="0"/>
+              <a:t> to </a:t>
+            </a:r>
+            <a:r>
+              <a:rPr lang="en-US" i="1" dirty="0" smtClean="0"/>
+              <a:t>N-1</a:t>
             </a:r>
           </a:p>
           <a:p>

</xml_diff>

<commit_message>
slide on chained consumers
</commit_message>
<xml_diff>
--- a/docs/slides/07/07_streams.pptx
+++ b/docs/slides/07/07_streams.pptx
@@ -5,7 +5,7 @@
     <p:sldMasterId id="2147483648" r:id="rId1"/>
   </p:sldMasterIdLst>
   <p:notesMasterIdLst>
-    <p:notesMasterId r:id="rId27"/>
+    <p:notesMasterId r:id="rId28"/>
   </p:notesMasterIdLst>
   <p:sldIdLst>
     <p:sldId id="281" r:id="rId2"/>
@@ -32,7 +32,8 @@
     <p:sldId id="303" r:id="rId23"/>
     <p:sldId id="304" r:id="rId24"/>
     <p:sldId id="307" r:id="rId25"/>
-    <p:sldId id="282" r:id="rId26"/>
+    <p:sldId id="308" r:id="rId26"/>
+    <p:sldId id="282" r:id="rId27"/>
   </p:sldIdLst>
   <p:sldSz cx="13004800" cy="9753600"/>
   <p:notesSz cx="6858000" cy="9144000"/>
@@ -2180,7 +2181,7 @@
           </a:ln>
           <a:extLst>
             <a:ext uri="{C572A759-6A51-4108-AA02-DFA0A04FC94B}">
-              <ma14:wrappingTextBoxFlag xmlns="" xmlns:ma14="http://schemas.microsoft.com/office/mac/drawingml/2011/main" val="1"/>
+              <ma14:wrappingTextBoxFlag xmlns:ma14="http://schemas.microsoft.com/office/mac/drawingml/2011/main" xmlns="" val="1"/>
             </a:ext>
           </a:extLst>
         </p:spPr>
@@ -2219,7 +2220,7 @@
           </a:ln>
           <a:extLst>
             <a:ext uri="{C572A759-6A51-4108-AA02-DFA0A04FC94B}">
-              <ma14:wrappingTextBoxFlag xmlns="" xmlns:ma14="http://schemas.microsoft.com/office/mac/drawingml/2011/main" val="1"/>
+              <ma14:wrappingTextBoxFlag xmlns:ma14="http://schemas.microsoft.com/office/mac/drawingml/2011/main" xmlns="" val="1"/>
             </a:ext>
           </a:extLst>
         </p:spPr>
@@ -11785,6 +11786,1750 @@
 </file>
 
 <file path=ppt/slides/slide25.xml><?xml version="1.0" encoding="utf-8"?>
+<p:sld xmlns:a="http://schemas.openxmlformats.org/drawingml/2006/main" xmlns:r="http://schemas.openxmlformats.org/officeDocument/2006/relationships" xmlns:p="http://schemas.openxmlformats.org/presentationml/2006/main">
+  <p:cSld>
+    <p:spTree>
+      <p:nvGrpSpPr>
+        <p:cNvPr id="1" name=""/>
+        <p:cNvGrpSpPr/>
+        <p:nvPr/>
+      </p:nvGrpSpPr>
+      <p:grpSpPr>
+        <a:xfrm>
+          <a:off x="0" y="0"/>
+          <a:ext cx="0" cy="0"/>
+          <a:chOff x="0" y="0"/>
+          <a:chExt cx="0" cy="0"/>
+        </a:xfrm>
+      </p:grpSpPr>
+      <p:sp>
+        <p:nvSpPr>
+          <p:cNvPr id="3" name="Text Placeholder 2">
+            <a:extLst>
+              <a:ext uri="{FF2B5EF4-FFF2-40B4-BE49-F238E27FC236}">
+                <a16:creationId xmlns:a16="http://schemas.microsoft.com/office/drawing/2014/main" id="{87007DE7-A54E-9142-B815-5EF792AFFCB5}"/>
+              </a:ext>
+            </a:extLst>
+          </p:cNvPr>
+          <p:cNvSpPr>
+            <a:spLocks noGrp="1"/>
+          </p:cNvSpPr>
+          <p:nvPr>
+            <p:ph type="body" idx="1"/>
+          </p:nvPr>
+        </p:nvSpPr>
+        <p:spPr>
+          <a:xfrm>
+            <a:off x="169681" y="7937368"/>
+            <a:ext cx="12594211" cy="1696825"/>
+          </a:xfrm>
+        </p:spPr>
+        <p:txBody>
+          <a:bodyPr/>
+          <a:lstStyle/>
+          <a:p>
+            <a:r>
+              <a:rPr lang="en-US" dirty="0"/>
+              <a:t>Each Pipe has a Consumer&lt;IN&gt;, and also a </a:t>
+            </a:r>
+            <a:r>
+              <a:rPr lang="en-US" i="1" dirty="0"/>
+              <a:t>downstream</a:t>
+            </a:r>
+            <a:r>
+              <a:rPr lang="en-US" dirty="0"/>
+              <a:t> reference to the Consumer&lt;OUT&gt; in the next pipe</a:t>
+            </a:r>
+          </a:p>
+        </p:txBody>
+      </p:sp>
+      <p:pic>
+        <p:nvPicPr>
+          <p:cNvPr id="4" name="Picture 2" descr="Image result for pipe cartoon">
+            <a:extLst>
+              <a:ext uri="{FF2B5EF4-FFF2-40B4-BE49-F238E27FC236}">
+                <a16:creationId xmlns:a16="http://schemas.microsoft.com/office/drawing/2014/main" id="{F0B9644D-AB5C-5644-8BA9-F8E24B85A7AA}"/>
+              </a:ext>
+            </a:extLst>
+          </p:cNvPr>
+          <p:cNvPicPr>
+            <a:picLocks noChangeAspect="1" noChangeArrowheads="1"/>
+          </p:cNvPicPr>
+          <p:nvPr/>
+        </p:nvPicPr>
+        <p:blipFill>
+          <a:blip r:embed="rId2" cstate="print">
+            <a:extLst>
+              <a:ext uri="{28A0092B-C50C-407E-A947-70E740481C1C}">
+                <a14:useLocalDpi xmlns:a14="http://schemas.microsoft.com/office/drawing/2010/main" val="0"/>
+              </a:ext>
+            </a:extLst>
+          </a:blip>
+          <a:srcRect/>
+          <a:stretch>
+            <a:fillRect/>
+          </a:stretch>
+        </p:blipFill>
+        <p:spPr bwMode="auto">
+          <a:xfrm>
+            <a:off x="2060332" y="1162718"/>
+            <a:ext cx="1577002" cy="1324682"/>
+          </a:xfrm>
+          <a:prstGeom prst="rect">
+            <a:avLst/>
+          </a:prstGeom>
+          <a:noFill/>
+          <a:extLst>
+            <a:ext uri="{909E8E84-426E-40DD-AFC4-6F175D3DCCD1}">
+              <a14:hiddenFill xmlns:a14="http://schemas.microsoft.com/office/drawing/2010/main">
+                <a:solidFill>
+                  <a:srgbClr val="FFFFFF"/>
+                </a:solidFill>
+              </a14:hiddenFill>
+            </a:ext>
+          </a:extLst>
+        </p:spPr>
+      </p:pic>
+      <p:sp>
+        <p:nvSpPr>
+          <p:cNvPr id="5" name="Right Arrow 4">
+            <a:extLst>
+              <a:ext uri="{FF2B5EF4-FFF2-40B4-BE49-F238E27FC236}">
+                <a16:creationId xmlns:a16="http://schemas.microsoft.com/office/drawing/2014/main" id="{DA2DA926-BF3E-B54F-9719-D11678E521D3}"/>
+              </a:ext>
+            </a:extLst>
+          </p:cNvPr>
+          <p:cNvSpPr/>
+          <p:nvPr/>
+        </p:nvSpPr>
+        <p:spPr>
+          <a:xfrm>
+            <a:off x="767909" y="1278010"/>
+            <a:ext cx="1018205" cy="1038013"/>
+          </a:xfrm>
+          <a:prstGeom prst="rightArrow">
+            <a:avLst/>
+          </a:prstGeom>
+          <a:solidFill>
+            <a:schemeClr val="tx1"/>
+          </a:solidFill>
+          <a:ln w="12700" cap="flat">
+            <a:noFill/>
+            <a:miter lim="400000"/>
+          </a:ln>
+          <a:effectLst>
+            <a:outerShdw blurRad="38100" dist="25400" dir="5400000" rotWithShape="0">
+              <a:srgbClr val="000000">
+                <a:alpha val="50000"/>
+              </a:srgbClr>
+            </a:outerShdw>
+          </a:effectLst>
+          <a:sp3d/>
+        </p:spPr>
+        <p:style>
+          <a:lnRef idx="0">
+            <a:scrgbClr r="0" g="0" b="0"/>
+          </a:lnRef>
+          <a:fillRef idx="0">
+            <a:scrgbClr r="0" g="0" b="0"/>
+          </a:fillRef>
+          <a:effectRef idx="0">
+            <a:scrgbClr r="0" g="0" b="0"/>
+          </a:effectRef>
+          <a:fontRef idx="none"/>
+        </p:style>
+        <p:txBody>
+          <a:bodyPr rot="0" spcFirstLastPara="1" vertOverflow="overflow" horzOverflow="overflow" vert="horz" wrap="square" lIns="50800" tIns="50800" rIns="50800" bIns="50800" numCol="1" spcCol="38100" rtlCol="0" anchor="ctr">
+            <a:spAutoFit/>
+          </a:bodyPr>
+          <a:lstStyle/>
+          <a:p>
+            <a:pPr marL="0" marR="0" indent="0" algn="ctr" defTabSz="584200" rtl="0" fontAlgn="auto" latinLnBrk="0" hangingPunct="0">
+              <a:lnSpc>
+                <a:spcPct val="100000"/>
+              </a:lnSpc>
+              <a:spcBef>
+                <a:spcPts val="0"/>
+              </a:spcBef>
+              <a:spcAft>
+                <a:spcPts val="0"/>
+              </a:spcAft>
+              <a:buClrTx/>
+              <a:buSzTx/>
+              <a:buFontTx/>
+              <a:buNone/>
+              <a:tabLst/>
+            </a:pPr>
+            <a:endParaRPr kumimoji="0" lang="en-US" sz="2400" b="0" i="0" u="none" strike="noStrike" cap="none" spc="0" normalizeH="0" baseline="0">
+              <a:ln>
+                <a:noFill/>
+              </a:ln>
+              <a:solidFill>
+                <a:srgbClr val="FFFFFF"/>
+              </a:solidFill>
+              <a:effectLst/>
+              <a:uFillTx/>
+              <a:latin typeface="+mn-lt"/>
+              <a:ea typeface="+mn-ea"/>
+              <a:cs typeface="+mn-cs"/>
+              <a:sym typeface="Helvetica Light"/>
+            </a:endParaRPr>
+          </a:p>
+        </p:txBody>
+      </p:sp>
+      <p:sp>
+        <p:nvSpPr>
+          <p:cNvPr id="6" name="Right Arrow 5">
+            <a:extLst>
+              <a:ext uri="{FF2B5EF4-FFF2-40B4-BE49-F238E27FC236}">
+                <a16:creationId xmlns:a16="http://schemas.microsoft.com/office/drawing/2014/main" id="{637098E0-D1AE-C04D-9565-F346A3057B7B}"/>
+              </a:ext>
+            </a:extLst>
+          </p:cNvPr>
+          <p:cNvSpPr/>
+          <p:nvPr/>
+        </p:nvSpPr>
+        <p:spPr>
+          <a:xfrm>
+            <a:off x="6988128" y="1239878"/>
+            <a:ext cx="1018205" cy="1038013"/>
+          </a:xfrm>
+          <a:prstGeom prst="rightArrow">
+            <a:avLst/>
+          </a:prstGeom>
+          <a:solidFill>
+            <a:schemeClr val="tx1"/>
+          </a:solidFill>
+          <a:ln w="12700" cap="flat">
+            <a:noFill/>
+            <a:miter lim="400000"/>
+          </a:ln>
+          <a:effectLst>
+            <a:outerShdw blurRad="38100" dist="25400" dir="5400000" rotWithShape="0">
+              <a:srgbClr val="000000">
+                <a:alpha val="50000"/>
+              </a:srgbClr>
+            </a:outerShdw>
+          </a:effectLst>
+          <a:sp3d/>
+        </p:spPr>
+        <p:style>
+          <a:lnRef idx="0">
+            <a:scrgbClr r="0" g="0" b="0"/>
+          </a:lnRef>
+          <a:fillRef idx="0">
+            <a:scrgbClr r="0" g="0" b="0"/>
+          </a:fillRef>
+          <a:effectRef idx="0">
+            <a:scrgbClr r="0" g="0" b="0"/>
+          </a:effectRef>
+          <a:fontRef idx="none"/>
+        </p:style>
+        <p:txBody>
+          <a:bodyPr rot="0" spcFirstLastPara="1" vertOverflow="overflow" horzOverflow="overflow" vert="horz" wrap="square" lIns="50800" tIns="50800" rIns="50800" bIns="50800" numCol="1" spcCol="38100" rtlCol="0" anchor="ctr">
+            <a:spAutoFit/>
+          </a:bodyPr>
+          <a:lstStyle/>
+          <a:p>
+            <a:pPr marL="0" marR="0" indent="0" algn="ctr" defTabSz="584200" rtl="0" fontAlgn="auto" latinLnBrk="0" hangingPunct="0">
+              <a:lnSpc>
+                <a:spcPct val="100000"/>
+              </a:lnSpc>
+              <a:spcBef>
+                <a:spcPts val="0"/>
+              </a:spcBef>
+              <a:spcAft>
+                <a:spcPts val="0"/>
+              </a:spcAft>
+              <a:buClrTx/>
+              <a:buSzTx/>
+              <a:buFontTx/>
+              <a:buNone/>
+              <a:tabLst/>
+            </a:pPr>
+            <a:endParaRPr kumimoji="0" lang="en-US" sz="2400" b="0" i="0" u="none" strike="noStrike" cap="none" spc="0" normalizeH="0" baseline="0">
+              <a:ln>
+                <a:noFill/>
+              </a:ln>
+              <a:solidFill>
+                <a:srgbClr val="FFFFFF"/>
+              </a:solidFill>
+              <a:effectLst/>
+              <a:uFillTx/>
+              <a:latin typeface="+mn-lt"/>
+              <a:ea typeface="+mn-ea"/>
+              <a:cs typeface="+mn-cs"/>
+              <a:sym typeface="Helvetica Light"/>
+            </a:endParaRPr>
+          </a:p>
+        </p:txBody>
+      </p:sp>
+      <p:sp>
+        <p:nvSpPr>
+          <p:cNvPr id="7" name="TextBox 6">
+            <a:extLst>
+              <a:ext uri="{FF2B5EF4-FFF2-40B4-BE49-F238E27FC236}">
+                <a16:creationId xmlns:a16="http://schemas.microsoft.com/office/drawing/2014/main" id="{A10273C5-22CE-2E42-9C25-4E48B982FDFE}"/>
+              </a:ext>
+            </a:extLst>
+          </p:cNvPr>
+          <p:cNvSpPr txBox="1"/>
+          <p:nvPr/>
+        </p:nvSpPr>
+        <p:spPr>
+          <a:xfrm>
+            <a:off x="1013855" y="2342915"/>
+            <a:ext cx="352661" cy="595035"/>
+          </a:xfrm>
+          <a:prstGeom prst="rect">
+            <a:avLst/>
+          </a:prstGeom>
+          <a:noFill/>
+          <a:ln w="12700" cap="flat">
+            <a:noFill/>
+            <a:miter lim="400000"/>
+          </a:ln>
+          <a:effectLst/>
+          <a:sp3d/>
+        </p:spPr>
+        <p:style>
+          <a:lnRef idx="0">
+            <a:scrgbClr r="0" g="0" b="0"/>
+          </a:lnRef>
+          <a:fillRef idx="0">
+            <a:scrgbClr r="0" g="0" b="0"/>
+          </a:fillRef>
+          <a:effectRef idx="0">
+            <a:scrgbClr r="0" g="0" b="0"/>
+          </a:effectRef>
+          <a:fontRef idx="none"/>
+        </p:style>
+        <p:txBody>
+          <a:bodyPr rot="0" spcFirstLastPara="1" vertOverflow="overflow" horzOverflow="overflow" vert="horz" wrap="none" lIns="50800" tIns="50800" rIns="50800" bIns="50800" numCol="1" spcCol="38100" rtlCol="0" anchor="ctr">
+            <a:spAutoFit/>
+          </a:bodyPr>
+          <a:lstStyle/>
+          <a:p>
+            <a:pPr marL="0" marR="0" indent="0" algn="ctr" defTabSz="584200" rtl="0" fontAlgn="auto" latinLnBrk="0" hangingPunct="0">
+              <a:lnSpc>
+                <a:spcPct val="100000"/>
+              </a:lnSpc>
+              <a:spcBef>
+                <a:spcPts val="0"/>
+              </a:spcBef>
+              <a:spcAft>
+                <a:spcPts val="0"/>
+              </a:spcAft>
+              <a:buClrTx/>
+              <a:buSzTx/>
+              <a:buFontTx/>
+              <a:buNone/>
+              <a:tabLst/>
+            </a:pPr>
+            <a:r>
+              <a:rPr lang="en-US" sz="3200" dirty="0"/>
+              <a:t>T</a:t>
+            </a:r>
+            <a:endParaRPr kumimoji="0" lang="en-US" sz="3200" b="0" i="0" u="none" strike="noStrike" cap="none" spc="0" normalizeH="0" baseline="0" dirty="0">
+              <a:ln>
+                <a:noFill/>
+              </a:ln>
+              <a:solidFill>
+                <a:srgbClr val="000000"/>
+              </a:solidFill>
+              <a:effectLst/>
+              <a:uFillTx/>
+              <a:latin typeface="+mn-lt"/>
+              <a:ea typeface="+mn-ea"/>
+              <a:cs typeface="+mn-cs"/>
+              <a:sym typeface="Helvetica Light"/>
+            </a:endParaRPr>
+          </a:p>
+        </p:txBody>
+      </p:sp>
+      <p:sp>
+        <p:nvSpPr>
+          <p:cNvPr id="8" name="TextBox 7">
+            <a:extLst>
+              <a:ext uri="{FF2B5EF4-FFF2-40B4-BE49-F238E27FC236}">
+                <a16:creationId xmlns:a16="http://schemas.microsoft.com/office/drawing/2014/main" id="{ADC6D6EA-6153-F54B-BD0C-57E6FB077DB4}"/>
+              </a:ext>
+            </a:extLst>
+          </p:cNvPr>
+          <p:cNvSpPr txBox="1"/>
+          <p:nvPr/>
+        </p:nvSpPr>
+        <p:spPr>
+          <a:xfrm>
+            <a:off x="6684659" y="2304783"/>
+            <a:ext cx="1469954" cy="595035"/>
+          </a:xfrm>
+          <a:prstGeom prst="rect">
+            <a:avLst/>
+          </a:prstGeom>
+          <a:noFill/>
+          <a:ln w="12700" cap="flat">
+            <a:noFill/>
+            <a:miter lim="400000"/>
+          </a:ln>
+          <a:effectLst/>
+          <a:sp3d/>
+        </p:spPr>
+        <p:style>
+          <a:lnRef idx="0">
+            <a:scrgbClr r="0" g="0" b="0"/>
+          </a:lnRef>
+          <a:fillRef idx="0">
+            <a:scrgbClr r="0" g="0" b="0"/>
+          </a:fillRef>
+          <a:effectRef idx="0">
+            <a:scrgbClr r="0" g="0" b="0"/>
+          </a:effectRef>
+          <a:fontRef idx="none"/>
+        </p:style>
+        <p:txBody>
+          <a:bodyPr rot="0" spcFirstLastPara="1" vertOverflow="overflow" horzOverflow="overflow" vert="horz" wrap="none" lIns="50800" tIns="50800" rIns="50800" bIns="50800" numCol="1" spcCol="38100" rtlCol="0" anchor="ctr">
+            <a:spAutoFit/>
+          </a:bodyPr>
+          <a:lstStyle/>
+          <a:p>
+            <a:pPr marL="0" marR="0" indent="0" algn="ctr" defTabSz="584200" rtl="0" fontAlgn="auto" latinLnBrk="0" hangingPunct="0">
+              <a:lnSpc>
+                <a:spcPct val="100000"/>
+              </a:lnSpc>
+              <a:spcBef>
+                <a:spcPts val="0"/>
+              </a:spcBef>
+              <a:spcAft>
+                <a:spcPts val="0"/>
+              </a:spcAft>
+              <a:buClrTx/>
+              <a:buSzTx/>
+              <a:buFontTx/>
+              <a:buNone/>
+              <a:tabLst/>
+            </a:pPr>
+            <a:r>
+              <a:rPr lang="en-US" sz="3200" dirty="0"/>
+              <a:t>OUT_B</a:t>
+            </a:r>
+            <a:endParaRPr kumimoji="0" lang="en-US" sz="3200" b="0" i="0" u="none" strike="noStrike" cap="none" spc="0" normalizeH="0" baseline="0" dirty="0">
+              <a:ln>
+                <a:noFill/>
+              </a:ln>
+              <a:solidFill>
+                <a:srgbClr val="000000"/>
+              </a:solidFill>
+              <a:effectLst/>
+              <a:uFillTx/>
+              <a:latin typeface="+mn-lt"/>
+              <a:ea typeface="+mn-ea"/>
+              <a:cs typeface="+mn-cs"/>
+              <a:sym typeface="Helvetica Light"/>
+            </a:endParaRPr>
+          </a:p>
+        </p:txBody>
+      </p:sp>
+      <p:pic>
+        <p:nvPicPr>
+          <p:cNvPr id="9" name="Picture 2" descr="Image result for pipe cartoon">
+            <a:extLst>
+              <a:ext uri="{FF2B5EF4-FFF2-40B4-BE49-F238E27FC236}">
+                <a16:creationId xmlns:a16="http://schemas.microsoft.com/office/drawing/2014/main" id="{F7DD8B4D-B695-F240-8ED7-B66D23D1D4AB}"/>
+              </a:ext>
+            </a:extLst>
+          </p:cNvPr>
+          <p:cNvPicPr>
+            <a:picLocks noChangeAspect="1" noChangeArrowheads="1"/>
+          </p:cNvPicPr>
+          <p:nvPr/>
+        </p:nvPicPr>
+        <p:blipFill>
+          <a:blip r:embed="rId2" cstate="print">
+            <a:extLst>
+              <a:ext uri="{28A0092B-C50C-407E-A947-70E740481C1C}">
+                <a14:useLocalDpi xmlns:a14="http://schemas.microsoft.com/office/drawing/2010/main" val="0"/>
+              </a:ext>
+            </a:extLst>
+          </a:blip>
+          <a:srcRect/>
+          <a:stretch>
+            <a:fillRect/>
+          </a:stretch>
+        </p:blipFill>
+        <p:spPr bwMode="auto">
+          <a:xfrm>
+            <a:off x="5129660" y="1162718"/>
+            <a:ext cx="1577002" cy="1324682"/>
+          </a:xfrm>
+          <a:prstGeom prst="rect">
+            <a:avLst/>
+          </a:prstGeom>
+          <a:noFill/>
+          <a:extLst>
+            <a:ext uri="{909E8E84-426E-40DD-AFC4-6F175D3DCCD1}">
+              <a14:hiddenFill xmlns:a14="http://schemas.microsoft.com/office/drawing/2010/main">
+                <a:solidFill>
+                  <a:srgbClr val="FFFFFF"/>
+                </a:solidFill>
+              </a14:hiddenFill>
+            </a:ext>
+          </a:extLst>
+        </p:spPr>
+      </p:pic>
+      <p:sp>
+        <p:nvSpPr>
+          <p:cNvPr id="10" name="Right Arrow 9">
+            <a:extLst>
+              <a:ext uri="{FF2B5EF4-FFF2-40B4-BE49-F238E27FC236}">
+                <a16:creationId xmlns:a16="http://schemas.microsoft.com/office/drawing/2014/main" id="{525AD1F2-C949-044A-B3AA-05FE390132C5}"/>
+              </a:ext>
+            </a:extLst>
+          </p:cNvPr>
+          <p:cNvSpPr/>
+          <p:nvPr/>
+        </p:nvSpPr>
+        <p:spPr>
+          <a:xfrm>
+            <a:off x="3837237" y="1278010"/>
+            <a:ext cx="1018205" cy="1038013"/>
+          </a:xfrm>
+          <a:prstGeom prst="rightArrow">
+            <a:avLst/>
+          </a:prstGeom>
+          <a:solidFill>
+            <a:schemeClr val="tx1"/>
+          </a:solidFill>
+          <a:ln w="12700" cap="flat">
+            <a:noFill/>
+            <a:miter lim="400000"/>
+          </a:ln>
+          <a:effectLst>
+            <a:outerShdw blurRad="38100" dist="25400" dir="5400000" rotWithShape="0">
+              <a:srgbClr val="000000">
+                <a:alpha val="50000"/>
+              </a:srgbClr>
+            </a:outerShdw>
+          </a:effectLst>
+          <a:sp3d/>
+        </p:spPr>
+        <p:style>
+          <a:lnRef idx="0">
+            <a:scrgbClr r="0" g="0" b="0"/>
+          </a:lnRef>
+          <a:fillRef idx="0">
+            <a:scrgbClr r="0" g="0" b="0"/>
+          </a:fillRef>
+          <a:effectRef idx="0">
+            <a:scrgbClr r="0" g="0" b="0"/>
+          </a:effectRef>
+          <a:fontRef idx="none"/>
+        </p:style>
+        <p:txBody>
+          <a:bodyPr rot="0" spcFirstLastPara="1" vertOverflow="overflow" horzOverflow="overflow" vert="horz" wrap="square" lIns="50800" tIns="50800" rIns="50800" bIns="50800" numCol="1" spcCol="38100" rtlCol="0" anchor="ctr">
+            <a:spAutoFit/>
+          </a:bodyPr>
+          <a:lstStyle/>
+          <a:p>
+            <a:pPr marL="0" marR="0" indent="0" algn="ctr" defTabSz="584200" rtl="0" fontAlgn="auto" latinLnBrk="0" hangingPunct="0">
+              <a:lnSpc>
+                <a:spcPct val="100000"/>
+              </a:lnSpc>
+              <a:spcBef>
+                <a:spcPts val="0"/>
+              </a:spcBef>
+              <a:spcAft>
+                <a:spcPts val="0"/>
+              </a:spcAft>
+              <a:buClrTx/>
+              <a:buSzTx/>
+              <a:buFontTx/>
+              <a:buNone/>
+              <a:tabLst/>
+            </a:pPr>
+            <a:endParaRPr kumimoji="0" lang="en-US" sz="2400" b="0" i="0" u="none" strike="noStrike" cap="none" spc="0" normalizeH="0" baseline="0">
+              <a:ln>
+                <a:noFill/>
+              </a:ln>
+              <a:solidFill>
+                <a:srgbClr val="FFFFFF"/>
+              </a:solidFill>
+              <a:effectLst/>
+              <a:uFillTx/>
+              <a:latin typeface="+mn-lt"/>
+              <a:ea typeface="+mn-ea"/>
+              <a:cs typeface="+mn-cs"/>
+              <a:sym typeface="Helvetica Light"/>
+            </a:endParaRPr>
+          </a:p>
+        </p:txBody>
+      </p:sp>
+      <p:sp>
+        <p:nvSpPr>
+          <p:cNvPr id="11" name="TextBox 10">
+            <a:extLst>
+              <a:ext uri="{FF2B5EF4-FFF2-40B4-BE49-F238E27FC236}">
+                <a16:creationId xmlns:a16="http://schemas.microsoft.com/office/drawing/2014/main" id="{0800225B-3532-4141-8A52-C8B2D616C8A2}"/>
+              </a:ext>
+            </a:extLst>
+          </p:cNvPr>
+          <p:cNvSpPr txBox="1"/>
+          <p:nvPr/>
+        </p:nvSpPr>
+        <p:spPr>
+          <a:xfrm>
+            <a:off x="3596173" y="2342914"/>
+            <a:ext cx="1469954" cy="595035"/>
+          </a:xfrm>
+          <a:prstGeom prst="rect">
+            <a:avLst/>
+          </a:prstGeom>
+          <a:noFill/>
+          <a:ln w="12700" cap="flat">
+            <a:noFill/>
+            <a:miter lim="400000"/>
+          </a:ln>
+          <a:effectLst/>
+          <a:sp3d/>
+        </p:spPr>
+        <p:style>
+          <a:lnRef idx="0">
+            <a:scrgbClr r="0" g="0" b="0"/>
+          </a:lnRef>
+          <a:fillRef idx="0">
+            <a:scrgbClr r="0" g="0" b="0"/>
+          </a:fillRef>
+          <a:effectRef idx="0">
+            <a:scrgbClr r="0" g="0" b="0"/>
+          </a:effectRef>
+          <a:fontRef idx="none"/>
+        </p:style>
+        <p:txBody>
+          <a:bodyPr rot="0" spcFirstLastPara="1" vertOverflow="overflow" horzOverflow="overflow" vert="horz" wrap="none" lIns="50800" tIns="50800" rIns="50800" bIns="50800" numCol="1" spcCol="38100" rtlCol="0" anchor="ctr">
+            <a:spAutoFit/>
+          </a:bodyPr>
+          <a:lstStyle/>
+          <a:p>
+            <a:pPr marL="0" marR="0" indent="0" algn="ctr" defTabSz="584200" rtl="0" fontAlgn="auto" latinLnBrk="0" hangingPunct="0">
+              <a:lnSpc>
+                <a:spcPct val="100000"/>
+              </a:lnSpc>
+              <a:spcBef>
+                <a:spcPts val="0"/>
+              </a:spcBef>
+              <a:spcAft>
+                <a:spcPts val="0"/>
+              </a:spcAft>
+              <a:buClrTx/>
+              <a:buSzTx/>
+              <a:buFontTx/>
+              <a:buNone/>
+              <a:tabLst/>
+            </a:pPr>
+            <a:r>
+              <a:rPr lang="en-US" sz="3200" dirty="0"/>
+              <a:t>OUT_A</a:t>
+            </a:r>
+            <a:endParaRPr kumimoji="0" lang="en-US" sz="3200" b="0" i="0" u="none" strike="noStrike" cap="none" spc="0" normalizeH="0" baseline="0" dirty="0">
+              <a:ln>
+                <a:noFill/>
+              </a:ln>
+              <a:solidFill>
+                <a:srgbClr val="000000"/>
+              </a:solidFill>
+              <a:effectLst/>
+              <a:uFillTx/>
+              <a:latin typeface="+mn-lt"/>
+              <a:ea typeface="+mn-ea"/>
+              <a:cs typeface="+mn-cs"/>
+              <a:sym typeface="Helvetica Light"/>
+            </a:endParaRPr>
+          </a:p>
+        </p:txBody>
+      </p:sp>
+      <p:sp>
+        <p:nvSpPr>
+          <p:cNvPr id="12" name="TextBox 11">
+            <a:extLst>
+              <a:ext uri="{FF2B5EF4-FFF2-40B4-BE49-F238E27FC236}">
+                <a16:creationId xmlns:a16="http://schemas.microsoft.com/office/drawing/2014/main" id="{1538AA8A-3A90-D442-A767-6D8DBF237871}"/>
+              </a:ext>
+            </a:extLst>
+          </p:cNvPr>
+          <p:cNvSpPr txBox="1"/>
+          <p:nvPr/>
+        </p:nvSpPr>
+        <p:spPr>
+          <a:xfrm>
+            <a:off x="5232299" y="282358"/>
+            <a:ext cx="1311256" cy="595035"/>
+          </a:xfrm>
+          <a:prstGeom prst="rect">
+            <a:avLst/>
+          </a:prstGeom>
+          <a:noFill/>
+          <a:ln w="12700" cap="flat">
+            <a:noFill/>
+            <a:miter lim="400000"/>
+          </a:ln>
+          <a:effectLst/>
+          <a:sp3d/>
+        </p:spPr>
+        <p:style>
+          <a:lnRef idx="0">
+            <a:scrgbClr r="0" g="0" b="0"/>
+          </a:lnRef>
+          <a:fillRef idx="0">
+            <a:scrgbClr r="0" g="0" b="0"/>
+          </a:fillRef>
+          <a:effectRef idx="0">
+            <a:scrgbClr r="0" g="0" b="0"/>
+          </a:effectRef>
+          <a:fontRef idx="none"/>
+        </p:style>
+        <p:txBody>
+          <a:bodyPr rot="0" spcFirstLastPara="1" vertOverflow="overflow" horzOverflow="overflow" vert="horz" wrap="none" lIns="50800" tIns="50800" rIns="50800" bIns="50800" numCol="1" spcCol="38100" rtlCol="0" anchor="ctr">
+            <a:spAutoFit/>
+          </a:bodyPr>
+          <a:lstStyle/>
+          <a:p>
+            <a:pPr marL="0" marR="0" indent="0" algn="ctr" defTabSz="584200" rtl="0" fontAlgn="auto" latinLnBrk="0" hangingPunct="0">
+              <a:lnSpc>
+                <a:spcPct val="100000"/>
+              </a:lnSpc>
+              <a:spcBef>
+                <a:spcPts val="0"/>
+              </a:spcBef>
+              <a:spcAft>
+                <a:spcPts val="0"/>
+              </a:spcAft>
+              <a:buClrTx/>
+              <a:buSzTx/>
+              <a:buFontTx/>
+              <a:buNone/>
+              <a:tabLst/>
+            </a:pPr>
+            <a:r>
+              <a:rPr kumimoji="0" lang="en-US" sz="3200" b="0" i="0" u="none" strike="noStrike" cap="none" spc="0" normalizeH="0" baseline="0" dirty="0">
+                <a:ln>
+                  <a:noFill/>
+                </a:ln>
+                <a:solidFill>
+                  <a:srgbClr val="000000"/>
+                </a:solidFill>
+                <a:effectLst/>
+                <a:uFillTx/>
+                <a:latin typeface="+mn-lt"/>
+                <a:ea typeface="+mn-ea"/>
+                <a:cs typeface="+mn-cs"/>
+                <a:sym typeface="Helvetica Light"/>
+              </a:rPr>
+              <a:t>Pipe</a:t>
+            </a:r>
+            <a:r>
+              <a:rPr kumimoji="0" lang="en-US" sz="3200" b="0" i="0" u="none" strike="noStrike" cap="none" spc="0" normalizeH="0" dirty="0">
+                <a:ln>
+                  <a:noFill/>
+                </a:ln>
+                <a:solidFill>
+                  <a:srgbClr val="000000"/>
+                </a:solidFill>
+                <a:effectLst/>
+                <a:uFillTx/>
+                <a:latin typeface="+mn-lt"/>
+                <a:ea typeface="+mn-ea"/>
+                <a:cs typeface="+mn-cs"/>
+                <a:sym typeface="Helvetica Light"/>
+              </a:rPr>
+              <a:t> B</a:t>
+            </a:r>
+            <a:endParaRPr kumimoji="0" lang="en-US" sz="3200" b="0" i="0" u="none" strike="noStrike" cap="none" spc="0" normalizeH="0" baseline="0" dirty="0">
+              <a:ln>
+                <a:noFill/>
+              </a:ln>
+              <a:solidFill>
+                <a:srgbClr val="000000"/>
+              </a:solidFill>
+              <a:effectLst/>
+              <a:uFillTx/>
+              <a:latin typeface="+mn-lt"/>
+              <a:ea typeface="+mn-ea"/>
+              <a:cs typeface="+mn-cs"/>
+              <a:sym typeface="Helvetica Light"/>
+            </a:endParaRPr>
+          </a:p>
+        </p:txBody>
+      </p:sp>
+      <p:sp>
+        <p:nvSpPr>
+          <p:cNvPr id="13" name="TextBox 12">
+            <a:extLst>
+              <a:ext uri="{FF2B5EF4-FFF2-40B4-BE49-F238E27FC236}">
+                <a16:creationId xmlns:a16="http://schemas.microsoft.com/office/drawing/2014/main" id="{572DC0D1-3FA7-944A-985B-1731F46B63D9}"/>
+              </a:ext>
+            </a:extLst>
+          </p:cNvPr>
+          <p:cNvSpPr txBox="1"/>
+          <p:nvPr/>
+        </p:nvSpPr>
+        <p:spPr>
+          <a:xfrm>
+            <a:off x="2193205" y="282358"/>
+            <a:ext cx="1311256" cy="595035"/>
+          </a:xfrm>
+          <a:prstGeom prst="rect">
+            <a:avLst/>
+          </a:prstGeom>
+          <a:noFill/>
+          <a:ln w="12700" cap="flat">
+            <a:noFill/>
+            <a:miter lim="400000"/>
+          </a:ln>
+          <a:effectLst/>
+          <a:sp3d/>
+        </p:spPr>
+        <p:style>
+          <a:lnRef idx="0">
+            <a:scrgbClr r="0" g="0" b="0"/>
+          </a:lnRef>
+          <a:fillRef idx="0">
+            <a:scrgbClr r="0" g="0" b="0"/>
+          </a:fillRef>
+          <a:effectRef idx="0">
+            <a:scrgbClr r="0" g="0" b="0"/>
+          </a:effectRef>
+          <a:fontRef idx="none"/>
+        </p:style>
+        <p:txBody>
+          <a:bodyPr rot="0" spcFirstLastPara="1" vertOverflow="overflow" horzOverflow="overflow" vert="horz" wrap="none" lIns="50800" tIns="50800" rIns="50800" bIns="50800" numCol="1" spcCol="38100" rtlCol="0" anchor="ctr">
+            <a:spAutoFit/>
+          </a:bodyPr>
+          <a:lstStyle/>
+          <a:p>
+            <a:pPr marL="0" marR="0" indent="0" algn="ctr" defTabSz="584200" rtl="0" fontAlgn="auto" latinLnBrk="0" hangingPunct="0">
+              <a:lnSpc>
+                <a:spcPct val="100000"/>
+              </a:lnSpc>
+              <a:spcBef>
+                <a:spcPts val="0"/>
+              </a:spcBef>
+              <a:spcAft>
+                <a:spcPts val="0"/>
+              </a:spcAft>
+              <a:buClrTx/>
+              <a:buSzTx/>
+              <a:buFontTx/>
+              <a:buNone/>
+              <a:tabLst/>
+            </a:pPr>
+            <a:r>
+              <a:rPr kumimoji="0" lang="en-US" sz="3200" b="0" i="0" u="none" strike="noStrike" cap="none" spc="0" normalizeH="0" baseline="0" dirty="0">
+                <a:ln>
+                  <a:noFill/>
+                </a:ln>
+                <a:solidFill>
+                  <a:srgbClr val="000000"/>
+                </a:solidFill>
+                <a:effectLst/>
+                <a:uFillTx/>
+                <a:latin typeface="+mn-lt"/>
+                <a:ea typeface="+mn-ea"/>
+                <a:cs typeface="+mn-cs"/>
+                <a:sym typeface="Helvetica Light"/>
+              </a:rPr>
+              <a:t>Pipe</a:t>
+            </a:r>
+            <a:r>
+              <a:rPr kumimoji="0" lang="en-US" sz="3200" b="0" i="0" u="none" strike="noStrike" cap="none" spc="0" normalizeH="0" dirty="0">
+                <a:ln>
+                  <a:noFill/>
+                </a:ln>
+                <a:solidFill>
+                  <a:srgbClr val="000000"/>
+                </a:solidFill>
+                <a:effectLst/>
+                <a:uFillTx/>
+                <a:latin typeface="+mn-lt"/>
+                <a:ea typeface="+mn-ea"/>
+                <a:cs typeface="+mn-cs"/>
+                <a:sym typeface="Helvetica Light"/>
+              </a:rPr>
+              <a:t> A</a:t>
+            </a:r>
+            <a:endParaRPr kumimoji="0" lang="en-US" sz="3200" b="0" i="0" u="none" strike="noStrike" cap="none" spc="0" normalizeH="0" baseline="0" dirty="0">
+              <a:ln>
+                <a:noFill/>
+              </a:ln>
+              <a:solidFill>
+                <a:srgbClr val="000000"/>
+              </a:solidFill>
+              <a:effectLst/>
+              <a:uFillTx/>
+              <a:latin typeface="+mn-lt"/>
+              <a:ea typeface="+mn-ea"/>
+              <a:cs typeface="+mn-cs"/>
+              <a:sym typeface="Helvetica Light"/>
+            </a:endParaRPr>
+          </a:p>
+        </p:txBody>
+      </p:sp>
+      <p:sp>
+        <p:nvSpPr>
+          <p:cNvPr id="14" name="Right Arrow 13">
+            <a:extLst>
+              <a:ext uri="{FF2B5EF4-FFF2-40B4-BE49-F238E27FC236}">
+                <a16:creationId xmlns:a16="http://schemas.microsoft.com/office/drawing/2014/main" id="{2015C5E1-7EC7-FF44-B931-A25EF62E1800}"/>
+              </a:ext>
+            </a:extLst>
+          </p:cNvPr>
+          <p:cNvSpPr/>
+          <p:nvPr/>
+        </p:nvSpPr>
+        <p:spPr>
+          <a:xfrm>
+            <a:off x="10183662" y="1245693"/>
+            <a:ext cx="1018205" cy="1038013"/>
+          </a:xfrm>
+          <a:prstGeom prst="rightArrow">
+            <a:avLst/>
+          </a:prstGeom>
+          <a:solidFill>
+            <a:schemeClr val="tx1"/>
+          </a:solidFill>
+          <a:ln w="12700" cap="flat">
+            <a:noFill/>
+            <a:miter lim="400000"/>
+          </a:ln>
+          <a:effectLst>
+            <a:outerShdw blurRad="38100" dist="25400" dir="5400000" rotWithShape="0">
+              <a:srgbClr val="000000">
+                <a:alpha val="50000"/>
+              </a:srgbClr>
+            </a:outerShdw>
+          </a:effectLst>
+          <a:sp3d/>
+        </p:spPr>
+        <p:style>
+          <a:lnRef idx="0">
+            <a:scrgbClr r="0" g="0" b="0"/>
+          </a:lnRef>
+          <a:fillRef idx="0">
+            <a:scrgbClr r="0" g="0" b="0"/>
+          </a:fillRef>
+          <a:effectRef idx="0">
+            <a:scrgbClr r="0" g="0" b="0"/>
+          </a:effectRef>
+          <a:fontRef idx="none"/>
+        </p:style>
+        <p:txBody>
+          <a:bodyPr rot="0" spcFirstLastPara="1" vertOverflow="overflow" horzOverflow="overflow" vert="horz" wrap="square" lIns="50800" tIns="50800" rIns="50800" bIns="50800" numCol="1" spcCol="38100" rtlCol="0" anchor="ctr">
+            <a:spAutoFit/>
+          </a:bodyPr>
+          <a:lstStyle/>
+          <a:p>
+            <a:pPr marL="0" marR="0" indent="0" algn="ctr" defTabSz="584200" rtl="0" fontAlgn="auto" latinLnBrk="0" hangingPunct="0">
+              <a:lnSpc>
+                <a:spcPct val="100000"/>
+              </a:lnSpc>
+              <a:spcBef>
+                <a:spcPts val="0"/>
+              </a:spcBef>
+              <a:spcAft>
+                <a:spcPts val="0"/>
+              </a:spcAft>
+              <a:buClrTx/>
+              <a:buSzTx/>
+              <a:buFontTx/>
+              <a:buNone/>
+              <a:tabLst/>
+            </a:pPr>
+            <a:endParaRPr kumimoji="0" lang="en-US" sz="2400" b="0" i="0" u="none" strike="noStrike" cap="none" spc="0" normalizeH="0" baseline="0">
+              <a:ln>
+                <a:noFill/>
+              </a:ln>
+              <a:solidFill>
+                <a:srgbClr val="FFFFFF"/>
+              </a:solidFill>
+              <a:effectLst/>
+              <a:uFillTx/>
+              <a:latin typeface="+mn-lt"/>
+              <a:ea typeface="+mn-ea"/>
+              <a:cs typeface="+mn-cs"/>
+              <a:sym typeface="Helvetica Light"/>
+            </a:endParaRPr>
+          </a:p>
+        </p:txBody>
+      </p:sp>
+      <p:sp>
+        <p:nvSpPr>
+          <p:cNvPr id="15" name="TextBox 14">
+            <a:extLst>
+              <a:ext uri="{FF2B5EF4-FFF2-40B4-BE49-F238E27FC236}">
+                <a16:creationId xmlns:a16="http://schemas.microsoft.com/office/drawing/2014/main" id="{FB7C059A-15EF-954A-9839-D9A62BB27A35}"/>
+              </a:ext>
+            </a:extLst>
+          </p:cNvPr>
+          <p:cNvSpPr txBox="1"/>
+          <p:nvPr/>
+        </p:nvSpPr>
+        <p:spPr>
+          <a:xfrm>
+            <a:off x="9891414" y="2310598"/>
+            <a:ext cx="1447512" cy="595035"/>
+          </a:xfrm>
+          <a:prstGeom prst="rect">
+            <a:avLst/>
+          </a:prstGeom>
+          <a:noFill/>
+          <a:ln w="12700" cap="flat">
+            <a:noFill/>
+            <a:miter lim="400000"/>
+          </a:ln>
+          <a:effectLst/>
+          <a:sp3d/>
+        </p:spPr>
+        <p:style>
+          <a:lnRef idx="0">
+            <a:scrgbClr r="0" g="0" b="0"/>
+          </a:lnRef>
+          <a:fillRef idx="0">
+            <a:scrgbClr r="0" g="0" b="0"/>
+          </a:fillRef>
+          <a:effectRef idx="0">
+            <a:scrgbClr r="0" g="0" b="0"/>
+          </a:effectRef>
+          <a:fontRef idx="none"/>
+        </p:style>
+        <p:txBody>
+          <a:bodyPr rot="0" spcFirstLastPara="1" vertOverflow="overflow" horzOverflow="overflow" vert="horz" wrap="none" lIns="50800" tIns="50800" rIns="50800" bIns="50800" numCol="1" spcCol="38100" rtlCol="0" anchor="ctr">
+            <a:spAutoFit/>
+          </a:bodyPr>
+          <a:lstStyle/>
+          <a:p>
+            <a:pPr marL="0" marR="0" indent="0" algn="ctr" defTabSz="584200" rtl="0" fontAlgn="auto" latinLnBrk="0" hangingPunct="0">
+              <a:lnSpc>
+                <a:spcPct val="100000"/>
+              </a:lnSpc>
+              <a:spcBef>
+                <a:spcPts val="0"/>
+              </a:spcBef>
+              <a:spcAft>
+                <a:spcPts val="0"/>
+              </a:spcAft>
+              <a:buClrTx/>
+              <a:buSzTx/>
+              <a:buFontTx/>
+              <a:buNone/>
+              <a:tabLst/>
+            </a:pPr>
+            <a:r>
+              <a:rPr lang="en-US" sz="3200" dirty="0"/>
+              <a:t>OUT_C</a:t>
+            </a:r>
+            <a:endParaRPr kumimoji="0" lang="en-US" sz="3200" b="0" i="0" u="none" strike="noStrike" cap="none" spc="0" normalizeH="0" baseline="0" dirty="0">
+              <a:ln>
+                <a:noFill/>
+              </a:ln>
+              <a:solidFill>
+                <a:srgbClr val="000000"/>
+              </a:solidFill>
+              <a:effectLst/>
+              <a:uFillTx/>
+              <a:latin typeface="+mn-lt"/>
+              <a:ea typeface="+mn-ea"/>
+              <a:cs typeface="+mn-cs"/>
+              <a:sym typeface="Helvetica Light"/>
+            </a:endParaRPr>
+          </a:p>
+        </p:txBody>
+      </p:sp>
+      <p:pic>
+        <p:nvPicPr>
+          <p:cNvPr id="16" name="Picture 2" descr="Image result for pipe cartoon">
+            <a:extLst>
+              <a:ext uri="{FF2B5EF4-FFF2-40B4-BE49-F238E27FC236}">
+                <a16:creationId xmlns:a16="http://schemas.microsoft.com/office/drawing/2014/main" id="{CD48078A-A37B-B747-97F7-E66A9C00F47C}"/>
+              </a:ext>
+            </a:extLst>
+          </p:cNvPr>
+          <p:cNvPicPr>
+            <a:picLocks noChangeAspect="1" noChangeArrowheads="1"/>
+          </p:cNvPicPr>
+          <p:nvPr/>
+        </p:nvPicPr>
+        <p:blipFill>
+          <a:blip r:embed="rId2" cstate="print">
+            <a:extLst>
+              <a:ext uri="{28A0092B-C50C-407E-A947-70E740481C1C}">
+                <a14:useLocalDpi xmlns:a14="http://schemas.microsoft.com/office/drawing/2010/main" val="0"/>
+              </a:ext>
+            </a:extLst>
+          </a:blip>
+          <a:srcRect/>
+          <a:stretch>
+            <a:fillRect/>
+          </a:stretch>
+        </p:blipFill>
+        <p:spPr bwMode="auto">
+          <a:xfrm>
+            <a:off x="8325194" y="1168533"/>
+            <a:ext cx="1577002" cy="1324682"/>
+          </a:xfrm>
+          <a:prstGeom prst="rect">
+            <a:avLst/>
+          </a:prstGeom>
+          <a:noFill/>
+          <a:extLst>
+            <a:ext uri="{909E8E84-426E-40DD-AFC4-6F175D3DCCD1}">
+              <a14:hiddenFill xmlns:a14="http://schemas.microsoft.com/office/drawing/2010/main">
+                <a:solidFill>
+                  <a:srgbClr val="FFFFFF"/>
+                </a:solidFill>
+              </a14:hiddenFill>
+            </a:ext>
+          </a:extLst>
+        </p:spPr>
+      </p:pic>
+      <p:sp>
+        <p:nvSpPr>
+          <p:cNvPr id="17" name="TextBox 16">
+            <a:extLst>
+              <a:ext uri="{FF2B5EF4-FFF2-40B4-BE49-F238E27FC236}">
+                <a16:creationId xmlns:a16="http://schemas.microsoft.com/office/drawing/2014/main" id="{931E60B8-3B49-9D4D-A58D-285BDC748B89}"/>
+              </a:ext>
+            </a:extLst>
+          </p:cNvPr>
+          <p:cNvSpPr txBox="1"/>
+          <p:nvPr/>
+        </p:nvSpPr>
+        <p:spPr>
+          <a:xfrm>
+            <a:off x="8417413" y="288173"/>
+            <a:ext cx="1332096" cy="595035"/>
+          </a:xfrm>
+          <a:prstGeom prst="rect">
+            <a:avLst/>
+          </a:prstGeom>
+          <a:noFill/>
+          <a:ln w="12700" cap="flat">
+            <a:noFill/>
+            <a:miter lim="400000"/>
+          </a:ln>
+          <a:effectLst/>
+          <a:sp3d/>
+        </p:spPr>
+        <p:style>
+          <a:lnRef idx="0">
+            <a:scrgbClr r="0" g="0" b="0"/>
+          </a:lnRef>
+          <a:fillRef idx="0">
+            <a:scrgbClr r="0" g="0" b="0"/>
+          </a:fillRef>
+          <a:effectRef idx="0">
+            <a:scrgbClr r="0" g="0" b="0"/>
+          </a:effectRef>
+          <a:fontRef idx="none"/>
+        </p:style>
+        <p:txBody>
+          <a:bodyPr rot="0" spcFirstLastPara="1" vertOverflow="overflow" horzOverflow="overflow" vert="horz" wrap="none" lIns="50800" tIns="50800" rIns="50800" bIns="50800" numCol="1" spcCol="38100" rtlCol="0" anchor="ctr">
+            <a:spAutoFit/>
+          </a:bodyPr>
+          <a:lstStyle/>
+          <a:p>
+            <a:pPr marL="0" marR="0" indent="0" algn="ctr" defTabSz="584200" rtl="0" fontAlgn="auto" latinLnBrk="0" hangingPunct="0">
+              <a:lnSpc>
+                <a:spcPct val="100000"/>
+              </a:lnSpc>
+              <a:spcBef>
+                <a:spcPts val="0"/>
+              </a:spcBef>
+              <a:spcAft>
+                <a:spcPts val="0"/>
+              </a:spcAft>
+              <a:buClrTx/>
+              <a:buSzTx/>
+              <a:buFontTx/>
+              <a:buNone/>
+              <a:tabLst/>
+            </a:pPr>
+            <a:r>
+              <a:rPr kumimoji="0" lang="en-US" sz="3200" b="0" i="0" u="none" strike="noStrike" cap="none" spc="0" normalizeH="0" baseline="0" dirty="0">
+                <a:ln>
+                  <a:noFill/>
+                </a:ln>
+                <a:solidFill>
+                  <a:srgbClr val="000000"/>
+                </a:solidFill>
+                <a:effectLst/>
+                <a:uFillTx/>
+                <a:latin typeface="+mn-lt"/>
+                <a:ea typeface="+mn-ea"/>
+                <a:cs typeface="+mn-cs"/>
+                <a:sym typeface="Helvetica Light"/>
+              </a:rPr>
+              <a:t>Pipe</a:t>
+            </a:r>
+            <a:r>
+              <a:rPr kumimoji="0" lang="en-US" sz="3200" b="0" i="0" u="none" strike="noStrike" cap="none" spc="0" normalizeH="0" dirty="0">
+                <a:ln>
+                  <a:noFill/>
+                </a:ln>
+                <a:solidFill>
+                  <a:srgbClr val="000000"/>
+                </a:solidFill>
+                <a:effectLst/>
+                <a:uFillTx/>
+                <a:latin typeface="+mn-lt"/>
+                <a:ea typeface="+mn-ea"/>
+                <a:cs typeface="+mn-cs"/>
+                <a:sym typeface="Helvetica Light"/>
+              </a:rPr>
+              <a:t> C</a:t>
+            </a:r>
+            <a:endParaRPr kumimoji="0" lang="en-US" sz="3200" b="0" i="0" u="none" strike="noStrike" cap="none" spc="0" normalizeH="0" baseline="0" dirty="0">
+              <a:ln>
+                <a:noFill/>
+              </a:ln>
+              <a:solidFill>
+                <a:srgbClr val="000000"/>
+              </a:solidFill>
+              <a:effectLst/>
+              <a:uFillTx/>
+              <a:latin typeface="+mn-lt"/>
+              <a:ea typeface="+mn-ea"/>
+              <a:cs typeface="+mn-cs"/>
+              <a:sym typeface="Helvetica Light"/>
+            </a:endParaRPr>
+          </a:p>
+        </p:txBody>
+      </p:sp>
+      <p:sp>
+        <p:nvSpPr>
+          <p:cNvPr id="18" name="TextBox 17">
+            <a:extLst>
+              <a:ext uri="{FF2B5EF4-FFF2-40B4-BE49-F238E27FC236}">
+                <a16:creationId xmlns:a16="http://schemas.microsoft.com/office/drawing/2014/main" id="{D59A2DB9-7362-6244-A7B5-17BDAB548D9A}"/>
+              </a:ext>
+            </a:extLst>
+          </p:cNvPr>
+          <p:cNvSpPr txBox="1"/>
+          <p:nvPr/>
+        </p:nvSpPr>
+        <p:spPr>
+          <a:xfrm>
+            <a:off x="628098" y="2945524"/>
+            <a:ext cx="5188240" cy="2257028"/>
+          </a:xfrm>
+          <a:prstGeom prst="rect">
+            <a:avLst/>
+          </a:prstGeom>
+          <a:noFill/>
+          <a:ln w="12700" cap="flat">
+            <a:noFill/>
+            <a:miter lim="400000"/>
+          </a:ln>
+          <a:effectLst/>
+          <a:sp3d/>
+        </p:spPr>
+        <p:style>
+          <a:lnRef idx="0">
+            <a:scrgbClr r="0" g="0" b="0"/>
+          </a:lnRef>
+          <a:fillRef idx="0">
+            <a:scrgbClr r="0" g="0" b="0"/>
+          </a:fillRef>
+          <a:effectRef idx="0">
+            <a:scrgbClr r="0" g="0" b="0"/>
+          </a:effectRef>
+          <a:fontRef idx="none"/>
+        </p:style>
+        <p:txBody>
+          <a:bodyPr rot="0" spcFirstLastPara="1" vertOverflow="overflow" horzOverflow="overflow" vert="horz" wrap="square" lIns="50800" tIns="50800" rIns="50800" bIns="50800" numCol="1" spcCol="38100" rtlCol="0" anchor="ctr">
+            <a:spAutoFit/>
+          </a:bodyPr>
+          <a:lstStyle/>
+          <a:p>
+            <a:pPr marL="0" marR="0" indent="0" algn="l" defTabSz="584200" rtl="0" fontAlgn="auto" latinLnBrk="0" hangingPunct="0">
+              <a:lnSpc>
+                <a:spcPct val="100000"/>
+              </a:lnSpc>
+              <a:spcBef>
+                <a:spcPts val="0"/>
+              </a:spcBef>
+              <a:spcAft>
+                <a:spcPts val="0"/>
+              </a:spcAft>
+              <a:buClrTx/>
+              <a:buSzTx/>
+              <a:buFontTx/>
+              <a:buNone/>
+              <a:tabLst/>
+            </a:pPr>
+            <a:r>
+              <a:rPr kumimoji="0" lang="en-US" sz="2800" b="0" i="0" u="none" strike="noStrike" cap="none" spc="0" normalizeH="0" baseline="0" dirty="0">
+                <a:ln>
+                  <a:noFill/>
+                </a:ln>
+                <a:solidFill>
+                  <a:srgbClr val="000000"/>
+                </a:solidFill>
+                <a:effectLst/>
+                <a:uFillTx/>
+                <a:latin typeface="+mn-lt"/>
+                <a:ea typeface="+mn-ea"/>
+                <a:cs typeface="+mn-cs"/>
+                <a:sym typeface="Helvetica Light"/>
+              </a:rPr>
+              <a:t>//Pipe A</a:t>
+            </a:r>
+          </a:p>
+          <a:p>
+            <a:pPr marL="0" marR="0" indent="0" algn="l" defTabSz="584200" rtl="0" fontAlgn="auto" latinLnBrk="0" hangingPunct="0">
+              <a:lnSpc>
+                <a:spcPct val="100000"/>
+              </a:lnSpc>
+              <a:spcBef>
+                <a:spcPts val="0"/>
+              </a:spcBef>
+              <a:spcAft>
+                <a:spcPts val="0"/>
+              </a:spcAft>
+              <a:buClrTx/>
+              <a:buSzTx/>
+              <a:buFontTx/>
+              <a:buNone/>
+              <a:tabLst/>
+            </a:pPr>
+            <a:r>
+              <a:rPr kumimoji="0" lang="en-US" sz="2800" b="0" i="0" u="none" strike="noStrike" cap="none" spc="0" normalizeH="0" baseline="0" dirty="0">
+                <a:ln>
+                  <a:noFill/>
+                </a:ln>
+                <a:solidFill>
+                  <a:srgbClr val="000000"/>
+                </a:solidFill>
+                <a:effectLst/>
+                <a:uFillTx/>
+                <a:latin typeface="+mn-lt"/>
+                <a:ea typeface="+mn-ea"/>
+                <a:cs typeface="+mn-cs"/>
+                <a:sym typeface="Helvetica Light"/>
+              </a:rPr>
+              <a:t>Consumer&lt;T&gt;.accept(T in){</a:t>
+            </a:r>
+          </a:p>
+          <a:p>
+            <a:pPr marL="0" marR="0" indent="0" algn="l" defTabSz="584200" rtl="0" fontAlgn="auto" latinLnBrk="0" hangingPunct="0">
+              <a:lnSpc>
+                <a:spcPct val="100000"/>
+              </a:lnSpc>
+              <a:spcBef>
+                <a:spcPts val="0"/>
+              </a:spcBef>
+              <a:spcAft>
+                <a:spcPts val="0"/>
+              </a:spcAft>
+              <a:buClrTx/>
+              <a:buSzTx/>
+              <a:buFontTx/>
+              <a:buNone/>
+              <a:tabLst/>
+            </a:pPr>
+            <a:r>
+              <a:rPr lang="en-US" sz="2800" dirty="0"/>
+              <a:t>    … //process </a:t>
+            </a:r>
+            <a:r>
+              <a:rPr lang="en-US" sz="2800" b="1" dirty="0"/>
+              <a:t>in</a:t>
+            </a:r>
+            <a:r>
+              <a:rPr lang="en-US" sz="2800" dirty="0"/>
+              <a:t>, compute </a:t>
+            </a:r>
+            <a:r>
+              <a:rPr lang="en-US" sz="2800" b="1" dirty="0"/>
+              <a:t>out</a:t>
+            </a:r>
+          </a:p>
+          <a:p>
+            <a:pPr marL="0" marR="0" indent="0" algn="l" defTabSz="584200" rtl="0" fontAlgn="auto" latinLnBrk="0" hangingPunct="0">
+              <a:lnSpc>
+                <a:spcPct val="100000"/>
+              </a:lnSpc>
+              <a:spcBef>
+                <a:spcPts val="0"/>
+              </a:spcBef>
+              <a:spcAft>
+                <a:spcPts val="0"/>
+              </a:spcAft>
+              <a:buClrTx/>
+              <a:buSzTx/>
+              <a:buFontTx/>
+              <a:buNone/>
+              <a:tabLst/>
+            </a:pPr>
+            <a:r>
+              <a:rPr kumimoji="0" lang="en-US" sz="2800" b="0" i="0" u="none" strike="noStrike" cap="none" spc="0" normalizeH="0" baseline="0" dirty="0">
+                <a:ln>
+                  <a:noFill/>
+                </a:ln>
+                <a:solidFill>
+                  <a:srgbClr val="000000"/>
+                </a:solidFill>
+                <a:effectLst/>
+                <a:uFillTx/>
+                <a:latin typeface="+mn-lt"/>
+                <a:ea typeface="+mn-ea"/>
+                <a:cs typeface="+mn-cs"/>
+                <a:sym typeface="Helvetica Light"/>
+              </a:rPr>
+              <a:t>    </a:t>
+            </a:r>
+            <a:r>
+              <a:rPr kumimoji="0" lang="en-US" sz="2800" b="0" i="0" u="none" strike="noStrike" cap="none" spc="0" normalizeH="0" baseline="0" dirty="0" err="1">
+                <a:ln>
+                  <a:noFill/>
+                </a:ln>
+                <a:solidFill>
+                  <a:srgbClr val="000000"/>
+                </a:solidFill>
+                <a:effectLst/>
+                <a:uFillTx/>
+                <a:latin typeface="+mn-lt"/>
+                <a:ea typeface="+mn-ea"/>
+                <a:cs typeface="+mn-cs"/>
+                <a:sym typeface="Helvetica Light"/>
+              </a:rPr>
+              <a:t>pipeB.accept</a:t>
+            </a:r>
+            <a:r>
+              <a:rPr kumimoji="0" lang="en-US" sz="2800" b="0" i="0" u="none" strike="noStrike" cap="none" spc="0" normalizeH="0" baseline="0" dirty="0">
+                <a:ln>
+                  <a:noFill/>
+                </a:ln>
+                <a:solidFill>
+                  <a:srgbClr val="000000"/>
+                </a:solidFill>
+                <a:effectLst/>
+                <a:uFillTx/>
+                <a:latin typeface="+mn-lt"/>
+                <a:ea typeface="+mn-ea"/>
+                <a:cs typeface="+mn-cs"/>
+                <a:sym typeface="Helvetica Light"/>
+              </a:rPr>
+              <a:t>(out)</a:t>
+            </a:r>
+          </a:p>
+          <a:p>
+            <a:pPr marL="0" marR="0" indent="0" algn="l" defTabSz="584200" rtl="0" fontAlgn="auto" latinLnBrk="0" hangingPunct="0">
+              <a:lnSpc>
+                <a:spcPct val="100000"/>
+              </a:lnSpc>
+              <a:spcBef>
+                <a:spcPts val="0"/>
+              </a:spcBef>
+              <a:spcAft>
+                <a:spcPts val="0"/>
+              </a:spcAft>
+              <a:buClrTx/>
+              <a:buSzTx/>
+              <a:buFontTx/>
+              <a:buNone/>
+              <a:tabLst/>
+            </a:pPr>
+            <a:r>
+              <a:rPr lang="en-US" sz="2800" dirty="0"/>
+              <a:t>}</a:t>
+            </a:r>
+            <a:endParaRPr kumimoji="0" lang="en-US" sz="2800" b="0" i="0" u="none" strike="noStrike" cap="none" spc="0" normalizeH="0" baseline="0" dirty="0">
+              <a:ln>
+                <a:noFill/>
+              </a:ln>
+              <a:solidFill>
+                <a:srgbClr val="000000"/>
+              </a:solidFill>
+              <a:effectLst/>
+              <a:uFillTx/>
+              <a:latin typeface="+mn-lt"/>
+              <a:ea typeface="+mn-ea"/>
+              <a:cs typeface="+mn-cs"/>
+              <a:sym typeface="Helvetica Light"/>
+            </a:endParaRPr>
+          </a:p>
+        </p:txBody>
+      </p:sp>
+      <p:sp>
+        <p:nvSpPr>
+          <p:cNvPr id="19" name="TextBox 18">
+            <a:extLst>
+              <a:ext uri="{FF2B5EF4-FFF2-40B4-BE49-F238E27FC236}">
+                <a16:creationId xmlns:a16="http://schemas.microsoft.com/office/drawing/2014/main" id="{8C8B003B-9123-6941-AF4F-CC941C92A68C}"/>
+              </a:ext>
+            </a:extLst>
+          </p:cNvPr>
+          <p:cNvSpPr txBox="1"/>
+          <p:nvPr/>
+        </p:nvSpPr>
+        <p:spPr>
+          <a:xfrm>
+            <a:off x="4572226" y="4792244"/>
+            <a:ext cx="6477538" cy="2257028"/>
+          </a:xfrm>
+          <a:prstGeom prst="rect">
+            <a:avLst/>
+          </a:prstGeom>
+          <a:noFill/>
+          <a:ln w="12700" cap="flat">
+            <a:noFill/>
+            <a:miter lim="400000"/>
+          </a:ln>
+          <a:effectLst/>
+          <a:sp3d/>
+        </p:spPr>
+        <p:style>
+          <a:lnRef idx="0">
+            <a:scrgbClr r="0" g="0" b="0"/>
+          </a:lnRef>
+          <a:fillRef idx="0">
+            <a:scrgbClr r="0" g="0" b="0"/>
+          </a:fillRef>
+          <a:effectRef idx="0">
+            <a:scrgbClr r="0" g="0" b="0"/>
+          </a:effectRef>
+          <a:fontRef idx="none"/>
+        </p:style>
+        <p:txBody>
+          <a:bodyPr rot="0" spcFirstLastPara="1" vertOverflow="overflow" horzOverflow="overflow" vert="horz" wrap="square" lIns="50800" tIns="50800" rIns="50800" bIns="50800" numCol="1" spcCol="38100" rtlCol="0" anchor="ctr">
+            <a:spAutoFit/>
+          </a:bodyPr>
+          <a:lstStyle/>
+          <a:p>
+            <a:pPr marL="0" marR="0" indent="0" algn="l" defTabSz="584200" rtl="0" fontAlgn="auto" latinLnBrk="0" hangingPunct="0">
+              <a:lnSpc>
+                <a:spcPct val="100000"/>
+              </a:lnSpc>
+              <a:spcBef>
+                <a:spcPts val="0"/>
+              </a:spcBef>
+              <a:spcAft>
+                <a:spcPts val="0"/>
+              </a:spcAft>
+              <a:buClrTx/>
+              <a:buSzTx/>
+              <a:buFontTx/>
+              <a:buNone/>
+              <a:tabLst/>
+            </a:pPr>
+            <a:r>
+              <a:rPr kumimoji="0" lang="en-US" sz="2800" b="0" i="0" u="none" strike="noStrike" cap="none" spc="0" normalizeH="0" baseline="0" dirty="0">
+                <a:ln>
+                  <a:noFill/>
+                </a:ln>
+                <a:solidFill>
+                  <a:srgbClr val="000000"/>
+                </a:solidFill>
+                <a:effectLst/>
+                <a:uFillTx/>
+                <a:latin typeface="+mn-lt"/>
+                <a:ea typeface="+mn-ea"/>
+                <a:cs typeface="+mn-cs"/>
+                <a:sym typeface="Helvetica Light"/>
+              </a:rPr>
+              <a:t>// Pipe B</a:t>
+            </a:r>
+          </a:p>
+          <a:p>
+            <a:pPr marL="0" marR="0" indent="0" algn="l" defTabSz="584200" rtl="0" fontAlgn="auto" latinLnBrk="0" hangingPunct="0">
+              <a:lnSpc>
+                <a:spcPct val="100000"/>
+              </a:lnSpc>
+              <a:spcBef>
+                <a:spcPts val="0"/>
+              </a:spcBef>
+              <a:spcAft>
+                <a:spcPts val="0"/>
+              </a:spcAft>
+              <a:buClrTx/>
+              <a:buSzTx/>
+              <a:buFontTx/>
+              <a:buNone/>
+              <a:tabLst/>
+            </a:pPr>
+            <a:r>
+              <a:rPr kumimoji="0" lang="en-US" sz="2800" b="0" i="0" u="none" strike="noStrike" cap="none" spc="0" normalizeH="0" baseline="0" dirty="0">
+                <a:ln>
+                  <a:noFill/>
+                </a:ln>
+                <a:solidFill>
+                  <a:srgbClr val="000000"/>
+                </a:solidFill>
+                <a:effectLst/>
+                <a:uFillTx/>
+                <a:latin typeface="+mn-lt"/>
+                <a:ea typeface="+mn-ea"/>
+                <a:cs typeface="+mn-cs"/>
+                <a:sym typeface="Helvetica Light"/>
+              </a:rPr>
+              <a:t>Consumer&lt;OUT_A&gt;.accept(OUT_A in){</a:t>
+            </a:r>
+          </a:p>
+          <a:p>
+            <a:pPr marL="0" marR="0" indent="0" algn="l" defTabSz="584200" rtl="0" fontAlgn="auto" latinLnBrk="0" hangingPunct="0">
+              <a:lnSpc>
+                <a:spcPct val="100000"/>
+              </a:lnSpc>
+              <a:spcBef>
+                <a:spcPts val="0"/>
+              </a:spcBef>
+              <a:spcAft>
+                <a:spcPts val="0"/>
+              </a:spcAft>
+              <a:buClrTx/>
+              <a:buSzTx/>
+              <a:buFontTx/>
+              <a:buNone/>
+              <a:tabLst/>
+            </a:pPr>
+            <a:r>
+              <a:rPr lang="en-US" sz="2800" dirty="0"/>
+              <a:t>    … //process </a:t>
+            </a:r>
+            <a:r>
+              <a:rPr lang="en-US" sz="2800" b="1" dirty="0"/>
+              <a:t>in</a:t>
+            </a:r>
+            <a:r>
+              <a:rPr lang="en-US" sz="2800" dirty="0"/>
+              <a:t>, compute </a:t>
+            </a:r>
+            <a:r>
+              <a:rPr lang="en-US" sz="2800" b="1" dirty="0"/>
+              <a:t>out</a:t>
+            </a:r>
+          </a:p>
+          <a:p>
+            <a:pPr marL="0" marR="0" indent="0" algn="l" defTabSz="584200" rtl="0" fontAlgn="auto" latinLnBrk="0" hangingPunct="0">
+              <a:lnSpc>
+                <a:spcPct val="100000"/>
+              </a:lnSpc>
+              <a:spcBef>
+                <a:spcPts val="0"/>
+              </a:spcBef>
+              <a:spcAft>
+                <a:spcPts val="0"/>
+              </a:spcAft>
+              <a:buClrTx/>
+              <a:buSzTx/>
+              <a:buFontTx/>
+              <a:buNone/>
+              <a:tabLst/>
+            </a:pPr>
+            <a:r>
+              <a:rPr kumimoji="0" lang="en-US" sz="2800" b="0" i="0" u="none" strike="noStrike" cap="none" spc="0" normalizeH="0" baseline="0" dirty="0">
+                <a:ln>
+                  <a:noFill/>
+                </a:ln>
+                <a:solidFill>
+                  <a:srgbClr val="000000"/>
+                </a:solidFill>
+                <a:effectLst/>
+                <a:uFillTx/>
+                <a:latin typeface="+mn-lt"/>
+                <a:ea typeface="+mn-ea"/>
+                <a:cs typeface="+mn-cs"/>
+                <a:sym typeface="Helvetica Light"/>
+              </a:rPr>
+              <a:t>    </a:t>
+            </a:r>
+            <a:r>
+              <a:rPr kumimoji="0" lang="en-US" sz="2800" b="0" i="0" u="none" strike="noStrike" cap="none" spc="0" normalizeH="0" baseline="0" dirty="0" err="1">
+                <a:ln>
+                  <a:noFill/>
+                </a:ln>
+                <a:solidFill>
+                  <a:srgbClr val="000000"/>
+                </a:solidFill>
+                <a:effectLst/>
+                <a:uFillTx/>
+                <a:latin typeface="+mn-lt"/>
+                <a:ea typeface="+mn-ea"/>
+                <a:cs typeface="+mn-cs"/>
+                <a:sym typeface="Helvetica Light"/>
+              </a:rPr>
+              <a:t>pipeC.accept</a:t>
+            </a:r>
+            <a:r>
+              <a:rPr kumimoji="0" lang="en-US" sz="2800" b="0" i="0" u="none" strike="noStrike" cap="none" spc="0" normalizeH="0" baseline="0" dirty="0">
+                <a:ln>
+                  <a:noFill/>
+                </a:ln>
+                <a:solidFill>
+                  <a:srgbClr val="000000"/>
+                </a:solidFill>
+                <a:effectLst/>
+                <a:uFillTx/>
+                <a:latin typeface="+mn-lt"/>
+                <a:ea typeface="+mn-ea"/>
+                <a:cs typeface="+mn-cs"/>
+                <a:sym typeface="Helvetica Light"/>
+              </a:rPr>
+              <a:t>(out)</a:t>
+            </a:r>
+          </a:p>
+          <a:p>
+            <a:pPr marL="0" marR="0" indent="0" algn="l" defTabSz="584200" rtl="0" fontAlgn="auto" latinLnBrk="0" hangingPunct="0">
+              <a:lnSpc>
+                <a:spcPct val="100000"/>
+              </a:lnSpc>
+              <a:spcBef>
+                <a:spcPts val="0"/>
+              </a:spcBef>
+              <a:spcAft>
+                <a:spcPts val="0"/>
+              </a:spcAft>
+              <a:buClrTx/>
+              <a:buSzTx/>
+              <a:buFontTx/>
+              <a:buNone/>
+              <a:tabLst/>
+            </a:pPr>
+            <a:r>
+              <a:rPr lang="en-US" sz="2800" dirty="0"/>
+              <a:t>}</a:t>
+            </a:r>
+            <a:endParaRPr kumimoji="0" lang="en-US" sz="2800" b="0" i="0" u="none" strike="noStrike" cap="none" spc="0" normalizeH="0" baseline="0" dirty="0">
+              <a:ln>
+                <a:noFill/>
+              </a:ln>
+              <a:solidFill>
+                <a:srgbClr val="000000"/>
+              </a:solidFill>
+              <a:effectLst/>
+              <a:uFillTx/>
+              <a:latin typeface="+mn-lt"/>
+              <a:ea typeface="+mn-ea"/>
+              <a:cs typeface="+mn-cs"/>
+              <a:sym typeface="Helvetica Light"/>
+            </a:endParaRPr>
+          </a:p>
+        </p:txBody>
+      </p:sp>
+    </p:spTree>
+    <p:extLst>
+      <p:ext uri="{BB962C8B-B14F-4D97-AF65-F5344CB8AC3E}">
+        <p14:creationId xmlns:p14="http://schemas.microsoft.com/office/powerpoint/2010/main" val="2788558942"/>
+      </p:ext>
+    </p:extLst>
+  </p:cSld>
+  <p:clrMapOvr>
+    <a:masterClrMapping/>
+  </p:clrMapOvr>
+  <p:transition spd="med"/>
+</p:sld>
+</file>
+
+<file path=ppt/slides/slide26.xml><?xml version="1.0" encoding="utf-8"?>
 <p:sld xmlns:a="http://schemas.openxmlformats.org/drawingml/2006/main" xmlns:r="http://schemas.openxmlformats.org/officeDocument/2006/relationships" xmlns:p="http://schemas.openxmlformats.org/presentationml/2006/main">
   <p:cSld>
     <p:spTree>

</xml_diff>